<commit_message>
09. Adding Layout to Employee Retention Page
</commit_message>
<xml_diff>
--- a/HR people layout.pptx
+++ b/HR people layout.pptx
@@ -107,6 +107,11 @@
       </a:defRPr>
     </a:lvl9pPr>
   </p:defaultTextStyle>
+  <p:extLst>
+    <p:ext uri="{EFAFB233-063F-42B5-8137-9DF3F51BA10A}">
+      <p15:sldGuideLst xmlns:p15="http://schemas.microsoft.com/office/powerpoint/2012/main"/>
+    </p:ext>
+  </p:extLst>
 </p:presentation>
 </file>
 
@@ -123,7 +128,7 @@
   <pc:docChgLst>
     <pc:chgData name="Gwizdek, Marcin" userId="b5cdd603-ee13-451a-a66f-f38407a19f3f" providerId="ADAL" clId="{B624E61B-BA8C-4B0B-ADAB-FE4A85893D2C}"/>
     <pc:docChg chg="undo custSel addSld delSld modSld modMainMaster">
-      <pc:chgData name="Gwizdek, Marcin" userId="b5cdd603-ee13-451a-a66f-f38407a19f3f" providerId="ADAL" clId="{B624E61B-BA8C-4B0B-ADAB-FE4A85893D2C}" dt="2025-05-09T15:42:51.113" v="342" actId="20577"/>
+      <pc:chgData name="Gwizdek, Marcin" userId="b5cdd603-ee13-451a-a66f-f38407a19f3f" providerId="ADAL" clId="{B624E61B-BA8C-4B0B-ADAB-FE4A85893D2C}" dt="2025-05-10T07:48:01.276" v="348" actId="255"/>
       <pc:docMkLst>
         <pc:docMk/>
       </pc:docMkLst>
@@ -215,7 +220,7 @@
         </pc:spChg>
       </pc:sldChg>
       <pc:sldChg chg="addSp delSp modSp add mod setBg">
-        <pc:chgData name="Gwizdek, Marcin" userId="b5cdd603-ee13-451a-a66f-f38407a19f3f" providerId="ADAL" clId="{B624E61B-BA8C-4B0B-ADAB-FE4A85893D2C}" dt="2025-05-09T15:41:33.302" v="274" actId="478"/>
+        <pc:chgData name="Gwizdek, Marcin" userId="b5cdd603-ee13-451a-a66f-f38407a19f3f" providerId="ADAL" clId="{B624E61B-BA8C-4B0B-ADAB-FE4A85893D2C}" dt="2025-05-10T07:47:50.529" v="346" actId="255"/>
         <pc:sldMkLst>
           <pc:docMk/>
           <pc:sldMk cId="2069673455" sldId="257"/>
@@ -317,7 +322,7 @@
           </ac:spMkLst>
         </pc:spChg>
         <pc:spChg chg="add mod">
-          <ac:chgData name="Gwizdek, Marcin" userId="b5cdd603-ee13-451a-a66f-f38407a19f3f" providerId="ADAL" clId="{B624E61B-BA8C-4B0B-ADAB-FE4A85893D2C}" dt="2025-05-09T15:40:33.834" v="266" actId="207"/>
+          <ac:chgData name="Gwizdek, Marcin" userId="b5cdd603-ee13-451a-a66f-f38407a19f3f" providerId="ADAL" clId="{B624E61B-BA8C-4B0B-ADAB-FE4A85893D2C}" dt="2025-05-10T07:47:50.529" v="346" actId="255"/>
           <ac:spMkLst>
             <pc:docMk/>
             <pc:sldMk cId="2069673455" sldId="257"/>
@@ -437,13 +442,13 @@
         </pc:sldMkLst>
       </pc:sldChg>
       <pc:sldChg chg="modSp add mod">
-        <pc:chgData name="Gwizdek, Marcin" userId="b5cdd603-ee13-451a-a66f-f38407a19f3f" providerId="ADAL" clId="{B624E61B-BA8C-4B0B-ADAB-FE4A85893D2C}" dt="2025-05-09T15:42:40.097" v="332" actId="20577"/>
+        <pc:chgData name="Gwizdek, Marcin" userId="b5cdd603-ee13-451a-a66f-f38407a19f3f" providerId="ADAL" clId="{B624E61B-BA8C-4B0B-ADAB-FE4A85893D2C}" dt="2025-05-10T07:47:57.566" v="347" actId="255"/>
         <pc:sldMkLst>
           <pc:docMk/>
           <pc:sldMk cId="2955499289" sldId="258"/>
         </pc:sldMkLst>
         <pc:spChg chg="mod">
-          <ac:chgData name="Gwizdek, Marcin" userId="b5cdd603-ee13-451a-a66f-f38407a19f3f" providerId="ADAL" clId="{B624E61B-BA8C-4B0B-ADAB-FE4A85893D2C}" dt="2025-05-09T15:42:40.097" v="332" actId="20577"/>
+          <ac:chgData name="Gwizdek, Marcin" userId="b5cdd603-ee13-451a-a66f-f38407a19f3f" providerId="ADAL" clId="{B624E61B-BA8C-4B0B-ADAB-FE4A85893D2C}" dt="2025-05-10T07:47:57.566" v="347" actId="255"/>
           <ac:spMkLst>
             <pc:docMk/>
             <pc:sldMk cId="2955499289" sldId="258"/>
@@ -459,13 +464,13 @@
         </pc:sldMkLst>
       </pc:sldChg>
       <pc:sldChg chg="modSp add mod">
-        <pc:chgData name="Gwizdek, Marcin" userId="b5cdd603-ee13-451a-a66f-f38407a19f3f" providerId="ADAL" clId="{B624E61B-BA8C-4B0B-ADAB-FE4A85893D2C}" dt="2025-05-09T15:42:51.113" v="342" actId="20577"/>
+        <pc:chgData name="Gwizdek, Marcin" userId="b5cdd603-ee13-451a-a66f-f38407a19f3f" providerId="ADAL" clId="{B624E61B-BA8C-4B0B-ADAB-FE4A85893D2C}" dt="2025-05-10T07:48:01.276" v="348" actId="255"/>
         <pc:sldMkLst>
           <pc:docMk/>
           <pc:sldMk cId="2504740161" sldId="259"/>
         </pc:sldMkLst>
         <pc:spChg chg="mod">
-          <ac:chgData name="Gwizdek, Marcin" userId="b5cdd603-ee13-451a-a66f-f38407a19f3f" providerId="ADAL" clId="{B624E61B-BA8C-4B0B-ADAB-FE4A85893D2C}" dt="2025-05-09T15:42:51.113" v="342" actId="20577"/>
+          <ac:chgData name="Gwizdek, Marcin" userId="b5cdd603-ee13-451a-a66f-f38407a19f3f" providerId="ADAL" clId="{B624E61B-BA8C-4B0B-ADAB-FE4A85893D2C}" dt="2025-05-10T07:48:01.276" v="348" actId="255"/>
           <ac:spMkLst>
             <pc:docMk/>
             <pc:sldMk cId="2504740161" sldId="259"/>
@@ -588,7 +593,7 @@
           <a:noFill/>
           <a:extLst>
             <a:ext uri="{909E8E84-426E-40dd-AFC4-6F175D3DCCD1}">
-              <a14:hiddenFill xmlns:a14="http://schemas.microsoft.com/office/drawing/2010/main" xmlns="">
+              <a14:hiddenFill xmlns="" xmlns:a14="http://schemas.microsoft.com/office/drawing/2010/main">
                 <a:solidFill>
                   <a:srgbClr val="FFFFFF"/>
                 </a:solidFill>
@@ -648,7 +653,7 @@
             </a:ln>
             <a:extLst>
               <a:ext uri="{91240B29-F687-4f45-9708-019B960494DF}">
-                <a14:hiddenLine xmlns:a14="http://schemas.microsoft.com/office/drawing/2010/main" xmlns="" w="9525">
+                <a14:hiddenLine xmlns="" xmlns:a14="http://schemas.microsoft.com/office/drawing/2010/main" w="9525">
                   <a:solidFill>
                     <a:srgbClr val="000000"/>
                   </a:solidFill>
@@ -738,7 +743,7 @@
             </a:ln>
             <a:extLst>
               <a:ext uri="{91240B29-F687-4f45-9708-019B960494DF}">
-                <a14:hiddenLine xmlns:a14="http://schemas.microsoft.com/office/drawing/2010/main" xmlns="" w="9525">
+                <a14:hiddenLine xmlns="" xmlns:a14="http://schemas.microsoft.com/office/drawing/2010/main" w="9525">
                   <a:solidFill>
                     <a:srgbClr val="000000"/>
                   </a:solidFill>
@@ -828,7 +833,7 @@
             </a:ln>
             <a:extLst>
               <a:ext uri="{91240B29-F687-4f45-9708-019B960494DF}">
-                <a14:hiddenLine xmlns:a14="http://schemas.microsoft.com/office/drawing/2010/main" xmlns="" w="9525">
+                <a14:hiddenLine xmlns="" xmlns:a14="http://schemas.microsoft.com/office/drawing/2010/main" w="9525">
                   <a:solidFill>
                     <a:srgbClr val="000000"/>
                   </a:solidFill>
@@ -862,7 +867,7 @@
             </a:ln>
             <a:extLst>
               <a:ext uri="{91240B29-F687-4f45-9708-019B960494DF}">
-                <a14:hiddenLine xmlns:a14="http://schemas.microsoft.com/office/drawing/2010/main" xmlns="" w="9525">
+                <a14:hiddenLine xmlns="" xmlns:a14="http://schemas.microsoft.com/office/drawing/2010/main" w="9525">
                   <a:solidFill>
                     <a:srgbClr val="000000"/>
                   </a:solidFill>
@@ -952,7 +957,7 @@
             </a:ln>
             <a:extLst>
               <a:ext uri="{91240B29-F687-4f45-9708-019B960494DF}">
-                <a14:hiddenLine xmlns:a14="http://schemas.microsoft.com/office/drawing/2010/main" xmlns="" w="9525">
+                <a14:hiddenLine xmlns="" xmlns:a14="http://schemas.microsoft.com/office/drawing/2010/main" w="9525">
                   <a:solidFill>
                     <a:srgbClr val="000000"/>
                   </a:solidFill>
@@ -1014,7 +1019,7 @@
             </a:ln>
             <a:extLst>
               <a:ext uri="{91240B29-F687-4f45-9708-019B960494DF}">
-                <a14:hiddenLine xmlns:a14="http://schemas.microsoft.com/office/drawing/2010/main" xmlns="" w="9525">
+                <a14:hiddenLine xmlns="" xmlns:a14="http://schemas.microsoft.com/office/drawing/2010/main" w="9525">
                   <a:solidFill>
                     <a:srgbClr val="000000"/>
                   </a:solidFill>
@@ -1076,7 +1081,7 @@
             </a:ln>
             <a:extLst>
               <a:ext uri="{91240B29-F687-4f45-9708-019B960494DF}">
-                <a14:hiddenLine xmlns:a14="http://schemas.microsoft.com/office/drawing/2010/main" xmlns="" w="9525">
+                <a14:hiddenLine xmlns="" xmlns:a14="http://schemas.microsoft.com/office/drawing/2010/main" w="9525">
                   <a:solidFill>
                     <a:srgbClr val="000000"/>
                   </a:solidFill>
@@ -1166,7 +1171,7 @@
             </a:ln>
             <a:extLst>
               <a:ext uri="{91240B29-F687-4f45-9708-019B960494DF}">
-                <a14:hiddenLine xmlns:a14="http://schemas.microsoft.com/office/drawing/2010/main" xmlns="" w="9525">
+                <a14:hiddenLine xmlns="" xmlns:a14="http://schemas.microsoft.com/office/drawing/2010/main" w="9525">
                   <a:solidFill>
                     <a:srgbClr val="000000"/>
                   </a:solidFill>
@@ -1228,7 +1233,7 @@
             </a:ln>
             <a:extLst>
               <a:ext uri="{91240B29-F687-4f45-9708-019B960494DF}">
-                <a14:hiddenLine xmlns:a14="http://schemas.microsoft.com/office/drawing/2010/main" xmlns="" w="9525">
+                <a14:hiddenLine xmlns="" xmlns:a14="http://schemas.microsoft.com/office/drawing/2010/main" w="9525">
                   <a:solidFill>
                     <a:srgbClr val="000000"/>
                   </a:solidFill>
@@ -1290,7 +1295,7 @@
             </a:ln>
             <a:extLst>
               <a:ext uri="{91240B29-F687-4f45-9708-019B960494DF}">
-                <a14:hiddenLine xmlns:a14="http://schemas.microsoft.com/office/drawing/2010/main" xmlns="" w="9525">
+                <a14:hiddenLine xmlns="" xmlns:a14="http://schemas.microsoft.com/office/drawing/2010/main" w="9525">
                   <a:solidFill>
                     <a:srgbClr val="000000"/>
                   </a:solidFill>
@@ -1380,7 +1385,7 @@
             </a:ln>
             <a:extLst>
               <a:ext uri="{91240B29-F687-4f45-9708-019B960494DF}">
-                <a14:hiddenLine xmlns:a14="http://schemas.microsoft.com/office/drawing/2010/main" xmlns="" w="9525">
+                <a14:hiddenLine xmlns="" xmlns:a14="http://schemas.microsoft.com/office/drawing/2010/main" w="9525">
                   <a:solidFill>
                     <a:srgbClr val="000000"/>
                   </a:solidFill>
@@ -1470,7 +1475,7 @@
             </a:ln>
             <a:extLst>
               <a:ext uri="{91240B29-F687-4f45-9708-019B960494DF}">
-                <a14:hiddenLine xmlns:a14="http://schemas.microsoft.com/office/drawing/2010/main" xmlns="" w="9525">
+                <a14:hiddenLine xmlns="" xmlns:a14="http://schemas.microsoft.com/office/drawing/2010/main" w="9525">
                   <a:solidFill>
                     <a:srgbClr val="000000"/>
                   </a:solidFill>
@@ -1532,7 +1537,7 @@
             </a:ln>
             <a:extLst>
               <a:ext uri="{91240B29-F687-4f45-9708-019B960494DF}">
-                <a14:hiddenLine xmlns:a14="http://schemas.microsoft.com/office/drawing/2010/main" xmlns="" w="9525">
+                <a14:hiddenLine xmlns="" xmlns:a14="http://schemas.microsoft.com/office/drawing/2010/main" w="9525">
                   <a:solidFill>
                     <a:srgbClr val="000000"/>
                   </a:solidFill>
@@ -1642,7 +1647,7 @@
             </a:ln>
             <a:extLst>
               <a:ext uri="{91240B29-F687-4f45-9708-019B960494DF}">
-                <a14:hiddenLine xmlns:a14="http://schemas.microsoft.com/office/drawing/2010/main" xmlns="" w="9525">
+                <a14:hiddenLine xmlns="" xmlns:a14="http://schemas.microsoft.com/office/drawing/2010/main" w="9525">
                   <a:solidFill>
                     <a:srgbClr val="000000"/>
                   </a:solidFill>
@@ -1704,7 +1709,7 @@
             </a:ln>
             <a:extLst>
               <a:ext uri="{91240B29-F687-4f45-9708-019B960494DF}">
-                <a14:hiddenLine xmlns:a14="http://schemas.microsoft.com/office/drawing/2010/main" xmlns="" w="9525">
+                <a14:hiddenLine xmlns="" xmlns:a14="http://schemas.microsoft.com/office/drawing/2010/main" w="9525">
                   <a:solidFill>
                     <a:srgbClr val="000000"/>
                   </a:solidFill>
@@ -1794,7 +1799,7 @@
             </a:ln>
             <a:extLst>
               <a:ext uri="{91240B29-F687-4f45-9708-019B960494DF}">
-                <a14:hiddenLine xmlns:a14="http://schemas.microsoft.com/office/drawing/2010/main" xmlns="" w="9525">
+                <a14:hiddenLine xmlns="" xmlns:a14="http://schemas.microsoft.com/office/drawing/2010/main" w="9525">
                   <a:solidFill>
                     <a:srgbClr val="000000"/>
                   </a:solidFill>
@@ -1884,7 +1889,7 @@
             </a:ln>
             <a:extLst>
               <a:ext uri="{91240B29-F687-4f45-9708-019B960494DF}">
-                <a14:hiddenLine xmlns:a14="http://schemas.microsoft.com/office/drawing/2010/main" xmlns="" w="9525">
+                <a14:hiddenLine xmlns="" xmlns:a14="http://schemas.microsoft.com/office/drawing/2010/main" w="9525">
                   <a:solidFill>
                     <a:srgbClr val="000000"/>
                   </a:solidFill>
@@ -1946,7 +1951,7 @@
             </a:ln>
             <a:extLst>
               <a:ext uri="{91240B29-F687-4f45-9708-019B960494DF}">
-                <a14:hiddenLine xmlns:a14="http://schemas.microsoft.com/office/drawing/2010/main" xmlns="" w="9525">
+                <a14:hiddenLine xmlns="" xmlns:a14="http://schemas.microsoft.com/office/drawing/2010/main" w="9525">
                   <a:solidFill>
                     <a:srgbClr val="000000"/>
                   </a:solidFill>
@@ -2036,7 +2041,7 @@
             </a:ln>
             <a:extLst>
               <a:ext uri="{91240B29-F687-4f45-9708-019B960494DF}">
-                <a14:hiddenLine xmlns:a14="http://schemas.microsoft.com/office/drawing/2010/main" xmlns="" w="9525">
+                <a14:hiddenLine xmlns="" xmlns:a14="http://schemas.microsoft.com/office/drawing/2010/main" w="9525">
                   <a:solidFill>
                     <a:srgbClr val="000000"/>
                   </a:solidFill>
@@ -2126,7 +2131,7 @@
             </a:ln>
             <a:extLst>
               <a:ext uri="{91240B29-F687-4f45-9708-019B960494DF}">
-                <a14:hiddenLine xmlns:a14="http://schemas.microsoft.com/office/drawing/2010/main" xmlns="" w="9525">
+                <a14:hiddenLine xmlns="" xmlns:a14="http://schemas.microsoft.com/office/drawing/2010/main" w="9525">
                   <a:solidFill>
                     <a:srgbClr val="000000"/>
                   </a:solidFill>
@@ -2182,7 +2187,7 @@
             </a:ln>
             <a:extLst>
               <a:ext uri="{91240B29-F687-4f45-9708-019B960494DF}">
-                <a14:hiddenLine xmlns:a14="http://schemas.microsoft.com/office/drawing/2010/main" xmlns="" w="9525">
+                <a14:hiddenLine xmlns="" xmlns:a14="http://schemas.microsoft.com/office/drawing/2010/main" w="9525">
                   <a:solidFill>
                     <a:srgbClr val="000000"/>
                   </a:solidFill>
@@ -2272,7 +2277,7 @@
             </a:ln>
             <a:extLst>
               <a:ext uri="{91240B29-F687-4f45-9708-019B960494DF}">
-                <a14:hiddenLine xmlns:a14="http://schemas.microsoft.com/office/drawing/2010/main" xmlns="" w="9525">
+                <a14:hiddenLine xmlns="" xmlns:a14="http://schemas.microsoft.com/office/drawing/2010/main" w="9525">
                   <a:solidFill>
                     <a:srgbClr val="000000"/>
                   </a:solidFill>
@@ -2328,7 +2333,7 @@
             </a:ln>
             <a:extLst>
               <a:ext uri="{91240B29-F687-4f45-9708-019B960494DF}">
-                <a14:hiddenLine xmlns:a14="http://schemas.microsoft.com/office/drawing/2010/main" xmlns="" w="9525">
+                <a14:hiddenLine xmlns="" xmlns:a14="http://schemas.microsoft.com/office/drawing/2010/main" w="9525">
                   <a:solidFill>
                     <a:srgbClr val="000000"/>
                   </a:solidFill>
@@ -2418,7 +2423,7 @@
             </a:ln>
             <a:extLst>
               <a:ext uri="{91240B29-F687-4f45-9708-019B960494DF}">
-                <a14:hiddenLine xmlns:a14="http://schemas.microsoft.com/office/drawing/2010/main" xmlns="" w="9525">
+                <a14:hiddenLine xmlns="" xmlns:a14="http://schemas.microsoft.com/office/drawing/2010/main" w="9525">
                   <a:solidFill>
                     <a:srgbClr val="000000"/>
                   </a:solidFill>
@@ -2486,7 +2491,7 @@
             </a:ln>
             <a:extLst>
               <a:ext uri="{91240B29-F687-4f45-9708-019B960494DF}">
-                <a14:hiddenLine xmlns:a14="http://schemas.microsoft.com/office/drawing/2010/main" xmlns="" w="9525">
+                <a14:hiddenLine xmlns="" xmlns:a14="http://schemas.microsoft.com/office/drawing/2010/main" w="9525">
                   <a:solidFill>
                     <a:srgbClr val="000000"/>
                   </a:solidFill>
@@ -2576,7 +2581,7 @@
             </a:ln>
             <a:extLst>
               <a:ext uri="{91240B29-F687-4f45-9708-019B960494DF}">
-                <a14:hiddenLine xmlns:a14="http://schemas.microsoft.com/office/drawing/2010/main" xmlns="" w="9525">
+                <a14:hiddenLine xmlns="" xmlns:a14="http://schemas.microsoft.com/office/drawing/2010/main" w="9525">
                   <a:solidFill>
                     <a:srgbClr val="000000"/>
                   </a:solidFill>
@@ -2644,7 +2649,7 @@
             </a:ln>
             <a:extLst>
               <a:ext uri="{91240B29-F687-4f45-9708-019B960494DF}">
-                <a14:hiddenLine xmlns:a14="http://schemas.microsoft.com/office/drawing/2010/main" xmlns="" w="9525">
+                <a14:hiddenLine xmlns="" xmlns:a14="http://schemas.microsoft.com/office/drawing/2010/main" w="9525">
                   <a:solidFill>
                     <a:srgbClr val="000000"/>
                   </a:solidFill>
@@ -2734,7 +2739,7 @@
             </a:ln>
             <a:extLst>
               <a:ext uri="{91240B29-F687-4f45-9708-019B960494DF}">
-                <a14:hiddenLine xmlns:a14="http://schemas.microsoft.com/office/drawing/2010/main" xmlns="" w="9525">
+                <a14:hiddenLine xmlns="" xmlns:a14="http://schemas.microsoft.com/office/drawing/2010/main" w="9525">
                   <a:solidFill>
                     <a:srgbClr val="000000"/>
                   </a:solidFill>
@@ -2768,7 +2773,7 @@
             </a:ln>
             <a:extLst>
               <a:ext uri="{91240B29-F687-4f45-9708-019B960494DF}">
-                <a14:hiddenLine xmlns:a14="http://schemas.microsoft.com/office/drawing/2010/main" xmlns="" w="9525">
+                <a14:hiddenLine xmlns="" xmlns:a14="http://schemas.microsoft.com/office/drawing/2010/main" w="9525">
                   <a:solidFill>
                     <a:srgbClr val="000000"/>
                   </a:solidFill>
@@ -2858,7 +2863,7 @@
             </a:ln>
             <a:extLst>
               <a:ext uri="{91240B29-F687-4f45-9708-019B960494DF}">
-                <a14:hiddenLine xmlns:a14="http://schemas.microsoft.com/office/drawing/2010/main" xmlns="" w="9525">
+                <a14:hiddenLine xmlns="" xmlns:a14="http://schemas.microsoft.com/office/drawing/2010/main" w="9525">
                   <a:solidFill>
                     <a:srgbClr val="000000"/>
                   </a:solidFill>
@@ -2920,7 +2925,7 @@
             </a:ln>
             <a:extLst>
               <a:ext uri="{91240B29-F687-4f45-9708-019B960494DF}">
-                <a14:hiddenLine xmlns:a14="http://schemas.microsoft.com/office/drawing/2010/main" xmlns="" w="9525">
+                <a14:hiddenLine xmlns="" xmlns:a14="http://schemas.microsoft.com/office/drawing/2010/main" w="9525">
                   <a:solidFill>
                     <a:srgbClr val="000000"/>
                   </a:solidFill>
@@ -2982,7 +2987,7 @@
             </a:ln>
             <a:extLst>
               <a:ext uri="{91240B29-F687-4f45-9708-019B960494DF}">
-                <a14:hiddenLine xmlns:a14="http://schemas.microsoft.com/office/drawing/2010/main" xmlns="" w="9525">
+                <a14:hiddenLine xmlns="" xmlns:a14="http://schemas.microsoft.com/office/drawing/2010/main" w="9525">
                   <a:solidFill>
                     <a:srgbClr val="000000"/>
                   </a:solidFill>
@@ -3072,7 +3077,7 @@
             </a:ln>
             <a:extLst>
               <a:ext uri="{91240B29-F687-4f45-9708-019B960494DF}">
-                <a14:hiddenLine xmlns:a14="http://schemas.microsoft.com/office/drawing/2010/main" xmlns="" w="9525">
+                <a14:hiddenLine xmlns="" xmlns:a14="http://schemas.microsoft.com/office/drawing/2010/main" w="9525">
                   <a:solidFill>
                     <a:srgbClr val="000000"/>
                   </a:solidFill>
@@ -3140,7 +3145,7 @@
             </a:ln>
             <a:extLst>
               <a:ext uri="{91240B29-F687-4f45-9708-019B960494DF}">
-                <a14:hiddenLine xmlns:a14="http://schemas.microsoft.com/office/drawing/2010/main" xmlns="" w="9525">
+                <a14:hiddenLine xmlns="" xmlns:a14="http://schemas.microsoft.com/office/drawing/2010/main" w="9525">
                   <a:solidFill>
                     <a:srgbClr val="000000"/>
                   </a:solidFill>
@@ -3202,7 +3207,7 @@
             </a:ln>
             <a:extLst>
               <a:ext uri="{91240B29-F687-4f45-9708-019B960494DF}">
-                <a14:hiddenLine xmlns:a14="http://schemas.microsoft.com/office/drawing/2010/main" xmlns="" w="9525">
+                <a14:hiddenLine xmlns="" xmlns:a14="http://schemas.microsoft.com/office/drawing/2010/main" w="9525">
                   <a:solidFill>
                     <a:srgbClr val="000000"/>
                   </a:solidFill>
@@ -3292,7 +3297,7 @@
             </a:ln>
             <a:extLst>
               <a:ext uri="{91240B29-F687-4f45-9708-019B960494DF}">
-                <a14:hiddenLine xmlns:a14="http://schemas.microsoft.com/office/drawing/2010/main" xmlns="" w="9525">
+                <a14:hiddenLine xmlns="" xmlns:a14="http://schemas.microsoft.com/office/drawing/2010/main" w="9525">
                   <a:solidFill>
                     <a:srgbClr val="000000"/>
                   </a:solidFill>
@@ -3354,7 +3359,7 @@
             </a:ln>
             <a:extLst>
               <a:ext uri="{91240B29-F687-4f45-9708-019B960494DF}">
-                <a14:hiddenLine xmlns:a14="http://schemas.microsoft.com/office/drawing/2010/main" xmlns="" w="9525">
+                <a14:hiddenLine xmlns="" xmlns:a14="http://schemas.microsoft.com/office/drawing/2010/main" w="9525">
                   <a:solidFill>
                     <a:srgbClr val="000000"/>
                   </a:solidFill>
@@ -3444,7 +3449,7 @@
             </a:ln>
             <a:extLst>
               <a:ext uri="{91240B29-F687-4f45-9708-019B960494DF}">
-                <a14:hiddenLine xmlns:a14="http://schemas.microsoft.com/office/drawing/2010/main" xmlns="" w="9525">
+                <a14:hiddenLine xmlns="" xmlns:a14="http://schemas.microsoft.com/office/drawing/2010/main" w="9525">
                   <a:solidFill>
                     <a:srgbClr val="000000"/>
                   </a:solidFill>
@@ -3506,7 +3511,7 @@
             </a:ln>
             <a:extLst>
               <a:ext uri="{91240B29-F687-4f45-9708-019B960494DF}">
-                <a14:hiddenLine xmlns:a14="http://schemas.microsoft.com/office/drawing/2010/main" xmlns="" w="9525">
+                <a14:hiddenLine xmlns="" xmlns:a14="http://schemas.microsoft.com/office/drawing/2010/main" w="9525">
                   <a:solidFill>
                     <a:srgbClr val="000000"/>
                   </a:solidFill>
@@ -3596,7 +3601,7 @@
             </a:ln>
             <a:extLst>
               <a:ext uri="{91240B29-F687-4f45-9708-019B960494DF}">
-                <a14:hiddenLine xmlns:a14="http://schemas.microsoft.com/office/drawing/2010/main" xmlns="" w="9525">
+                <a14:hiddenLine xmlns="" xmlns:a14="http://schemas.microsoft.com/office/drawing/2010/main" w="9525">
                   <a:solidFill>
                     <a:srgbClr val="000000"/>
                   </a:solidFill>
@@ -3630,7 +3635,7 @@
             </a:ln>
             <a:extLst>
               <a:ext uri="{91240B29-F687-4f45-9708-019B960494DF}">
-                <a14:hiddenLine xmlns:a14="http://schemas.microsoft.com/office/drawing/2010/main" xmlns="" w="9525">
+                <a14:hiddenLine xmlns="" xmlns:a14="http://schemas.microsoft.com/office/drawing/2010/main" w="9525">
                   <a:solidFill>
                     <a:srgbClr val="000000"/>
                   </a:solidFill>
@@ -3695,7 +3700,7 @@
             </a:ln>
             <a:extLst>
               <a:ext uri="{91240B29-F687-4f45-9708-019B960494DF}">
-                <a14:hiddenLine xmlns:a14="http://schemas.microsoft.com/office/drawing/2010/main" xmlns="" w="9525">
+                <a14:hiddenLine xmlns="" xmlns:a14="http://schemas.microsoft.com/office/drawing/2010/main" w="9525">
                   <a:solidFill>
                     <a:srgbClr val="000000"/>
                   </a:solidFill>
@@ -3785,7 +3790,7 @@
             </a:ln>
             <a:extLst>
               <a:ext uri="{91240B29-F687-4f45-9708-019B960494DF}">
-                <a14:hiddenLine xmlns:a14="http://schemas.microsoft.com/office/drawing/2010/main" xmlns="" w="9525">
+                <a14:hiddenLine xmlns="" xmlns:a14="http://schemas.microsoft.com/office/drawing/2010/main" w="9525">
                   <a:solidFill>
                     <a:srgbClr val="000000"/>
                   </a:solidFill>
@@ -3847,7 +3852,7 @@
             </a:ln>
             <a:extLst>
               <a:ext uri="{91240B29-F687-4f45-9708-019B960494DF}">
-                <a14:hiddenLine xmlns:a14="http://schemas.microsoft.com/office/drawing/2010/main" xmlns="" w="9525">
+                <a14:hiddenLine xmlns="" xmlns:a14="http://schemas.microsoft.com/office/drawing/2010/main" w="9525">
                   <a:solidFill>
                     <a:srgbClr val="000000"/>
                   </a:solidFill>
@@ -3937,7 +3942,7 @@
             </a:ln>
             <a:extLst>
               <a:ext uri="{91240B29-F687-4f45-9708-019B960494DF}">
-                <a14:hiddenLine xmlns:a14="http://schemas.microsoft.com/office/drawing/2010/main" xmlns="" w="9525">
+                <a14:hiddenLine xmlns="" xmlns:a14="http://schemas.microsoft.com/office/drawing/2010/main" w="9525">
                   <a:solidFill>
                     <a:srgbClr val="000000"/>
                   </a:solidFill>
@@ -4027,7 +4032,7 @@
             </a:ln>
             <a:extLst>
               <a:ext uri="{91240B29-F687-4f45-9708-019B960494DF}">
-                <a14:hiddenLine xmlns:a14="http://schemas.microsoft.com/office/drawing/2010/main" xmlns="" w="9525">
+                <a14:hiddenLine xmlns="" xmlns:a14="http://schemas.microsoft.com/office/drawing/2010/main" w="9525">
                   <a:solidFill>
                     <a:srgbClr val="000000"/>
                   </a:solidFill>
@@ -4092,7 +4097,7 @@
             </a:ln>
             <a:extLst>
               <a:ext uri="{91240B29-F687-4f45-9708-019B960494DF}">
-                <a14:hiddenLine xmlns:a14="http://schemas.microsoft.com/office/drawing/2010/main" xmlns="" w="9525">
+                <a14:hiddenLine xmlns="" xmlns:a14="http://schemas.microsoft.com/office/drawing/2010/main" w="9525">
                   <a:solidFill>
                     <a:srgbClr val="000000"/>
                   </a:solidFill>
@@ -4154,7 +4159,7 @@
             </a:ln>
             <a:extLst>
               <a:ext uri="{91240B29-F687-4f45-9708-019B960494DF}">
-                <a14:hiddenLine xmlns:a14="http://schemas.microsoft.com/office/drawing/2010/main" xmlns="" w="9525">
+                <a14:hiddenLine xmlns="" xmlns:a14="http://schemas.microsoft.com/office/drawing/2010/main" w="9525">
                   <a:solidFill>
                     <a:srgbClr val="000000"/>
                   </a:solidFill>
@@ -4244,7 +4249,7 @@
             </a:ln>
             <a:extLst>
               <a:ext uri="{91240B29-F687-4f45-9708-019B960494DF}">
-                <a14:hiddenLine xmlns:a14="http://schemas.microsoft.com/office/drawing/2010/main" xmlns="" w="9525">
+                <a14:hiddenLine xmlns="" xmlns:a14="http://schemas.microsoft.com/office/drawing/2010/main" w="9525">
                   <a:solidFill>
                     <a:srgbClr val="000000"/>
                   </a:solidFill>
@@ -4334,7 +4339,7 @@
             </a:ln>
             <a:extLst>
               <a:ext uri="{91240B29-F687-4f45-9708-019B960494DF}">
-                <a14:hiddenLine xmlns:a14="http://schemas.microsoft.com/office/drawing/2010/main" xmlns="" w="9525">
+                <a14:hiddenLine xmlns="" xmlns:a14="http://schemas.microsoft.com/office/drawing/2010/main" w="9525">
                   <a:solidFill>
                     <a:srgbClr val="000000"/>
                   </a:solidFill>
@@ -4396,7 +4401,7 @@
             </a:ln>
             <a:extLst>
               <a:ext uri="{91240B29-F687-4f45-9708-019B960494DF}">
-                <a14:hiddenLine xmlns:a14="http://schemas.microsoft.com/office/drawing/2010/main" xmlns="" w="9525">
+                <a14:hiddenLine xmlns="" xmlns:a14="http://schemas.microsoft.com/office/drawing/2010/main" w="9525">
                   <a:solidFill>
                     <a:srgbClr val="000000"/>
                   </a:solidFill>
@@ -4516,7 +4521,7 @@
             </a:ln>
             <a:extLst>
               <a:ext uri="{91240B29-F687-4f45-9708-019B960494DF}">
-                <a14:hiddenLine xmlns:a14="http://schemas.microsoft.com/office/drawing/2010/main" xmlns="" w="9525">
+                <a14:hiddenLine xmlns="" xmlns:a14="http://schemas.microsoft.com/office/drawing/2010/main" w="9525">
                   <a:solidFill>
                     <a:srgbClr val="000000"/>
                   </a:solidFill>
@@ -4584,7 +4589,7 @@
             </a:ln>
             <a:extLst>
               <a:ext uri="{91240B29-F687-4f45-9708-019B960494DF}">
-                <a14:hiddenLine xmlns:a14="http://schemas.microsoft.com/office/drawing/2010/main" xmlns="" w="9525">
+                <a14:hiddenLine xmlns="" xmlns:a14="http://schemas.microsoft.com/office/drawing/2010/main" w="9525">
                   <a:solidFill>
                     <a:srgbClr val="000000"/>
                   </a:solidFill>
@@ -4674,7 +4679,7 @@
             </a:ln>
             <a:extLst>
               <a:ext uri="{91240B29-F687-4f45-9708-019B960494DF}">
-                <a14:hiddenLine xmlns:a14="http://schemas.microsoft.com/office/drawing/2010/main" xmlns="" w="9525">
+                <a14:hiddenLine xmlns="" xmlns:a14="http://schemas.microsoft.com/office/drawing/2010/main" w="9525">
                   <a:solidFill>
                     <a:srgbClr val="000000"/>
                   </a:solidFill>
@@ -4814,7 +4819,7 @@
           <a:p>
             <a:fld id="{9BB8A965-9F7D-47D3-8EA6-86874B5CADDF}" type="datetimeFigureOut">
               <a:rPr lang="en-US" smtClean="0"/>
-              <a:t>5/9/2025</a:t>
+              <a:t>5/10/2025</a:t>
             </a:fld>
             <a:endParaRPr lang="en-US"/>
           </a:p>
@@ -5081,7 +5086,7 @@
           <a:p>
             <a:fld id="{9BB8A965-9F7D-47D3-8EA6-86874B5CADDF}" type="datetimeFigureOut">
               <a:rPr lang="en-US" smtClean="0"/>
-              <a:t>5/9/2025</a:t>
+              <a:t>5/10/2025</a:t>
             </a:fld>
             <a:endParaRPr lang="en-US"/>
           </a:p>
@@ -5277,7 +5282,7 @@
           <a:p>
             <a:fld id="{9BB8A965-9F7D-47D3-8EA6-86874B5CADDF}" type="datetimeFigureOut">
               <a:rPr lang="en-US" smtClean="0"/>
-              <a:t>5/9/2025</a:t>
+              <a:t>5/10/2025</a:t>
             </a:fld>
             <a:endParaRPr lang="en-US"/>
           </a:p>
@@ -5540,7 +5545,7 @@
           <a:p>
             <a:fld id="{9BB8A965-9F7D-47D3-8EA6-86874B5CADDF}" type="datetimeFigureOut">
               <a:rPr lang="en-US" smtClean="0"/>
-              <a:t>5/9/2025</a:t>
+              <a:t>5/10/2025</a:t>
             </a:fld>
             <a:endParaRPr lang="en-US"/>
           </a:p>
@@ -5974,7 +5979,7 @@
           <a:p>
             <a:fld id="{9BB8A965-9F7D-47D3-8EA6-86874B5CADDF}" type="datetimeFigureOut">
               <a:rPr lang="en-US" smtClean="0"/>
-              <a:t>5/9/2025</a:t>
+              <a:t>5/10/2025</a:t>
             </a:fld>
             <a:endParaRPr lang="en-US"/>
           </a:p>
@@ -6520,7 +6525,7 @@
           <a:p>
             <a:fld id="{9BB8A965-9F7D-47D3-8EA6-86874B5CADDF}" type="datetimeFigureOut">
               <a:rPr lang="en-US" smtClean="0"/>
-              <a:t>5/9/2025</a:t>
+              <a:t>5/10/2025</a:t>
             </a:fld>
             <a:endParaRPr lang="en-US"/>
           </a:p>
@@ -7240,7 +7245,7 @@
           <a:p>
             <a:fld id="{9BB8A965-9F7D-47D3-8EA6-86874B5CADDF}" type="datetimeFigureOut">
               <a:rPr lang="en-US" smtClean="0"/>
-              <a:t>5/9/2025</a:t>
+              <a:t>5/10/2025</a:t>
             </a:fld>
             <a:endParaRPr lang="en-US"/>
           </a:p>
@@ -7410,7 +7415,7 @@
           <a:p>
             <a:fld id="{9BB8A965-9F7D-47D3-8EA6-86874B5CADDF}" type="datetimeFigureOut">
               <a:rPr lang="en-US" smtClean="0"/>
-              <a:t>5/9/2025</a:t>
+              <a:t>5/10/2025</a:t>
             </a:fld>
             <a:endParaRPr lang="en-US"/>
           </a:p>
@@ -7590,7 +7595,7 @@
           <a:p>
             <a:fld id="{9BB8A965-9F7D-47D3-8EA6-86874B5CADDF}" type="datetimeFigureOut">
               <a:rPr lang="en-US" smtClean="0"/>
-              <a:t>5/9/2025</a:t>
+              <a:t>5/10/2025</a:t>
             </a:fld>
             <a:endParaRPr lang="en-US"/>
           </a:p>
@@ -7760,7 +7765,7 @@
           <a:p>
             <a:fld id="{9BB8A965-9F7D-47D3-8EA6-86874B5CADDF}" type="datetimeFigureOut">
               <a:rPr lang="en-US" smtClean="0"/>
-              <a:t>5/9/2025</a:t>
+              <a:t>5/10/2025</a:t>
             </a:fld>
             <a:endParaRPr lang="en-US"/>
           </a:p>
@@ -8010,7 +8015,7 @@
           <a:p>
             <a:fld id="{9BB8A965-9F7D-47D3-8EA6-86874B5CADDF}" type="datetimeFigureOut">
               <a:rPr lang="en-US" smtClean="0"/>
-              <a:t>5/9/2025</a:t>
+              <a:t>5/10/2025</a:t>
             </a:fld>
             <a:endParaRPr lang="en-US"/>
           </a:p>
@@ -8242,7 +8247,7 @@
           <a:p>
             <a:fld id="{9BB8A965-9F7D-47D3-8EA6-86874B5CADDF}" type="datetimeFigureOut">
               <a:rPr lang="en-US" smtClean="0"/>
-              <a:t>5/9/2025</a:t>
+              <a:t>5/10/2025</a:t>
             </a:fld>
             <a:endParaRPr lang="en-US"/>
           </a:p>
@@ -8623,7 +8628,7 @@
           <a:p>
             <a:fld id="{9BB8A965-9F7D-47D3-8EA6-86874B5CADDF}" type="datetimeFigureOut">
               <a:rPr lang="en-US" smtClean="0"/>
-              <a:t>5/9/2025</a:t>
+              <a:t>5/10/2025</a:t>
             </a:fld>
             <a:endParaRPr lang="en-US"/>
           </a:p>
@@ -8741,7 +8746,7 @@
           <a:p>
             <a:fld id="{9BB8A965-9F7D-47D3-8EA6-86874B5CADDF}" type="datetimeFigureOut">
               <a:rPr lang="en-US" smtClean="0"/>
-              <a:t>5/9/2025</a:t>
+              <a:t>5/10/2025</a:t>
             </a:fld>
             <a:endParaRPr lang="en-US"/>
           </a:p>
@@ -8836,7 +8841,7 @@
           <a:p>
             <a:fld id="{9BB8A965-9F7D-47D3-8EA6-86874B5CADDF}" type="datetimeFigureOut">
               <a:rPr lang="en-US" smtClean="0"/>
-              <a:t>5/9/2025</a:t>
+              <a:t>5/10/2025</a:t>
             </a:fld>
             <a:endParaRPr lang="en-US"/>
           </a:p>
@@ -9085,7 +9090,7 @@
           <a:p>
             <a:fld id="{9BB8A965-9F7D-47D3-8EA6-86874B5CADDF}" type="datetimeFigureOut">
               <a:rPr lang="en-US" smtClean="0"/>
-              <a:t>5/9/2025</a:t>
+              <a:t>5/10/2025</a:t>
             </a:fld>
             <a:endParaRPr lang="en-US"/>
           </a:p>
@@ -9365,7 +9370,7 @@
           <a:p>
             <a:fld id="{9BB8A965-9F7D-47D3-8EA6-86874B5CADDF}" type="datetimeFigureOut">
               <a:rPr lang="en-US" smtClean="0"/>
-              <a:t>5/9/2025</a:t>
+              <a:t>5/10/2025</a:t>
             </a:fld>
             <a:endParaRPr lang="en-US"/>
           </a:p>
@@ -9481,7 +9486,7 @@
           <a:noFill/>
           <a:extLst>
             <a:ext uri="{909E8E84-426E-40dd-AFC4-6F175D3DCCD1}">
-              <a14:hiddenFill xmlns:a14="http://schemas.microsoft.com/office/drawing/2010/main" xmlns="">
+              <a14:hiddenFill xmlns="" xmlns:a14="http://schemas.microsoft.com/office/drawing/2010/main">
                 <a:solidFill>
                   <a:srgbClr val="FFFFFF"/>
                 </a:solidFill>
@@ -9555,7 +9560,7 @@
               </a:ln>
               <a:extLst>
                 <a:ext uri="{91240B29-F687-4f45-9708-019B960494DF}">
-                  <a14:hiddenLine xmlns:a14="http://schemas.microsoft.com/office/drawing/2010/main" xmlns="" w="9525">
+                  <a14:hiddenLine xmlns="" xmlns:a14="http://schemas.microsoft.com/office/drawing/2010/main" w="9525">
                     <a:solidFill>
                       <a:srgbClr val="000000"/>
                     </a:solidFill>
@@ -9645,7 +9650,7 @@
               </a:ln>
               <a:extLst>
                 <a:ext uri="{91240B29-F687-4f45-9708-019B960494DF}">
-                  <a14:hiddenLine xmlns:a14="http://schemas.microsoft.com/office/drawing/2010/main" xmlns="" w="9525">
+                  <a14:hiddenLine xmlns="" xmlns:a14="http://schemas.microsoft.com/office/drawing/2010/main" w="9525">
                     <a:solidFill>
                       <a:srgbClr val="000000"/>
                     </a:solidFill>
@@ -9735,7 +9740,7 @@
               </a:ln>
               <a:extLst>
                 <a:ext uri="{91240B29-F687-4f45-9708-019B960494DF}">
-                  <a14:hiddenLine xmlns:a14="http://schemas.microsoft.com/office/drawing/2010/main" xmlns="" w="9525">
+                  <a14:hiddenLine xmlns="" xmlns:a14="http://schemas.microsoft.com/office/drawing/2010/main" w="9525">
                     <a:solidFill>
                       <a:srgbClr val="000000"/>
                     </a:solidFill>
@@ -9797,7 +9802,7 @@
               </a:ln>
               <a:extLst>
                 <a:ext uri="{91240B29-F687-4f45-9708-019B960494DF}">
-                  <a14:hiddenLine xmlns:a14="http://schemas.microsoft.com/office/drawing/2010/main" xmlns="" w="9525">
+                  <a14:hiddenLine xmlns="" xmlns:a14="http://schemas.microsoft.com/office/drawing/2010/main" w="9525">
                     <a:solidFill>
                       <a:srgbClr val="000000"/>
                     </a:solidFill>
@@ -9887,7 +9892,7 @@
               </a:ln>
               <a:extLst>
                 <a:ext uri="{91240B29-F687-4f45-9708-019B960494DF}">
-                  <a14:hiddenLine xmlns:a14="http://schemas.microsoft.com/office/drawing/2010/main" xmlns="" w="9525">
+                  <a14:hiddenLine xmlns="" xmlns:a14="http://schemas.microsoft.com/office/drawing/2010/main" w="9525">
                     <a:solidFill>
                       <a:srgbClr val="000000"/>
                     </a:solidFill>
@@ -9949,7 +9954,7 @@
               </a:ln>
               <a:extLst>
                 <a:ext uri="{91240B29-F687-4f45-9708-019B960494DF}">
-                  <a14:hiddenLine xmlns:a14="http://schemas.microsoft.com/office/drawing/2010/main" xmlns="" w="9525">
+                  <a14:hiddenLine xmlns="" xmlns:a14="http://schemas.microsoft.com/office/drawing/2010/main" w="9525">
                     <a:solidFill>
                       <a:srgbClr val="000000"/>
                     </a:solidFill>
@@ -10011,7 +10016,7 @@
               </a:ln>
               <a:extLst>
                 <a:ext uri="{91240B29-F687-4f45-9708-019B960494DF}">
-                  <a14:hiddenLine xmlns:a14="http://schemas.microsoft.com/office/drawing/2010/main" xmlns="" w="9525">
+                  <a14:hiddenLine xmlns="" xmlns:a14="http://schemas.microsoft.com/office/drawing/2010/main" w="9525">
                     <a:solidFill>
                       <a:srgbClr val="000000"/>
                     </a:solidFill>
@@ -10101,7 +10106,7 @@
               </a:ln>
               <a:extLst>
                 <a:ext uri="{91240B29-F687-4f45-9708-019B960494DF}">
-                  <a14:hiddenLine xmlns:a14="http://schemas.microsoft.com/office/drawing/2010/main" xmlns="" w="9525">
+                  <a14:hiddenLine xmlns="" xmlns:a14="http://schemas.microsoft.com/office/drawing/2010/main" w="9525">
                     <a:solidFill>
                       <a:srgbClr val="000000"/>
                     </a:solidFill>
@@ -10191,7 +10196,7 @@
               </a:ln>
               <a:extLst>
                 <a:ext uri="{91240B29-F687-4f45-9708-019B960494DF}">
-                  <a14:hiddenLine xmlns:a14="http://schemas.microsoft.com/office/drawing/2010/main" xmlns="" w="9525">
+                  <a14:hiddenLine xmlns="" xmlns:a14="http://schemas.microsoft.com/office/drawing/2010/main" w="9525">
                     <a:solidFill>
                       <a:srgbClr val="000000"/>
                     </a:solidFill>
@@ -10253,7 +10258,7 @@
               </a:ln>
               <a:extLst>
                 <a:ext uri="{91240B29-F687-4f45-9708-019B960494DF}">
-                  <a14:hiddenLine xmlns:a14="http://schemas.microsoft.com/office/drawing/2010/main" xmlns="" w="9525">
+                  <a14:hiddenLine xmlns="" xmlns:a14="http://schemas.microsoft.com/office/drawing/2010/main" w="9525">
                     <a:solidFill>
                       <a:srgbClr val="000000"/>
                     </a:solidFill>
@@ -10363,7 +10368,7 @@
               </a:ln>
               <a:extLst>
                 <a:ext uri="{91240B29-F687-4f45-9708-019B960494DF}">
-                  <a14:hiddenLine xmlns:a14="http://schemas.microsoft.com/office/drawing/2010/main" xmlns="" w="9525">
+                  <a14:hiddenLine xmlns="" xmlns:a14="http://schemas.microsoft.com/office/drawing/2010/main" w="9525">
                     <a:solidFill>
                       <a:srgbClr val="000000"/>
                     </a:solidFill>
@@ -10447,7 +10452,7 @@
               </a:ln>
               <a:extLst>
                 <a:ext uri="{91240B29-F687-4f45-9708-019B960494DF}">
-                  <a14:hiddenLine xmlns:a14="http://schemas.microsoft.com/office/drawing/2010/main" xmlns="" w="9525">
+                  <a14:hiddenLine xmlns="" xmlns:a14="http://schemas.microsoft.com/office/drawing/2010/main" w="9525">
                     <a:solidFill>
                       <a:srgbClr val="000000"/>
                     </a:solidFill>
@@ -10509,7 +10514,7 @@
               </a:ln>
               <a:extLst>
                 <a:ext uri="{91240B29-F687-4f45-9708-019B960494DF}">
-                  <a14:hiddenLine xmlns:a14="http://schemas.microsoft.com/office/drawing/2010/main" xmlns="" w="9525">
+                  <a14:hiddenLine xmlns="" xmlns:a14="http://schemas.microsoft.com/office/drawing/2010/main" w="9525">
                     <a:solidFill>
                       <a:srgbClr val="000000"/>
                     </a:solidFill>
@@ -10571,7 +10576,7 @@
               </a:ln>
               <a:extLst>
                 <a:ext uri="{91240B29-F687-4f45-9708-019B960494DF}">
-                  <a14:hiddenLine xmlns:a14="http://schemas.microsoft.com/office/drawing/2010/main" xmlns="" w="9525">
+                  <a14:hiddenLine xmlns="" xmlns:a14="http://schemas.microsoft.com/office/drawing/2010/main" w="9525">
                     <a:solidFill>
                       <a:srgbClr val="000000"/>
                     </a:solidFill>
@@ -10661,7 +10666,7 @@
               </a:ln>
               <a:extLst>
                 <a:ext uri="{91240B29-F687-4f45-9708-019B960494DF}">
-                  <a14:hiddenLine xmlns:a14="http://schemas.microsoft.com/office/drawing/2010/main" xmlns="" w="9525">
+                  <a14:hiddenLine xmlns="" xmlns:a14="http://schemas.microsoft.com/office/drawing/2010/main" w="9525">
                     <a:solidFill>
                       <a:srgbClr val="000000"/>
                     </a:solidFill>
@@ -10695,7 +10700,7 @@
               </a:ln>
               <a:extLst>
                 <a:ext uri="{91240B29-F687-4f45-9708-019B960494DF}">
-                  <a14:hiddenLine xmlns:a14="http://schemas.microsoft.com/office/drawing/2010/main" xmlns="" w="9525">
+                  <a14:hiddenLine xmlns="" xmlns:a14="http://schemas.microsoft.com/office/drawing/2010/main" w="9525">
                     <a:solidFill>
                       <a:srgbClr val="000000"/>
                     </a:solidFill>
@@ -10760,7 +10765,7 @@
               </a:ln>
               <a:extLst>
                 <a:ext uri="{91240B29-F687-4f45-9708-019B960494DF}">
-                  <a14:hiddenLine xmlns:a14="http://schemas.microsoft.com/office/drawing/2010/main" xmlns="" w="9525">
+                  <a14:hiddenLine xmlns="" xmlns:a14="http://schemas.microsoft.com/office/drawing/2010/main" w="9525">
                     <a:solidFill>
                       <a:srgbClr val="000000"/>
                     </a:solidFill>
@@ -10850,7 +10855,7 @@
               </a:ln>
               <a:extLst>
                 <a:ext uri="{91240B29-F687-4f45-9708-019B960494DF}">
-                  <a14:hiddenLine xmlns:a14="http://schemas.microsoft.com/office/drawing/2010/main" xmlns="" w="9525">
+                  <a14:hiddenLine xmlns="" xmlns:a14="http://schemas.microsoft.com/office/drawing/2010/main" w="9525">
                     <a:solidFill>
                       <a:srgbClr val="000000"/>
                     </a:solidFill>
@@ -10912,7 +10917,7 @@
               </a:ln>
               <a:extLst>
                 <a:ext uri="{91240B29-F687-4f45-9708-019B960494DF}">
-                  <a14:hiddenLine xmlns:a14="http://schemas.microsoft.com/office/drawing/2010/main" xmlns="" w="9525">
+                  <a14:hiddenLine xmlns="" xmlns:a14="http://schemas.microsoft.com/office/drawing/2010/main" w="9525">
                     <a:solidFill>
                       <a:srgbClr val="000000"/>
                     </a:solidFill>
@@ -11002,7 +11007,7 @@
               </a:ln>
               <a:extLst>
                 <a:ext uri="{91240B29-F687-4f45-9708-019B960494DF}">
-                  <a14:hiddenLine xmlns:a14="http://schemas.microsoft.com/office/drawing/2010/main" xmlns="" w="9525">
+                  <a14:hiddenLine xmlns="" xmlns:a14="http://schemas.microsoft.com/office/drawing/2010/main" w="9525">
                     <a:solidFill>
                       <a:srgbClr val="000000"/>
                     </a:solidFill>
@@ -11067,7 +11072,7 @@
               </a:ln>
               <a:extLst>
                 <a:ext uri="{91240B29-F687-4f45-9708-019B960494DF}">
-                  <a14:hiddenLine xmlns:a14="http://schemas.microsoft.com/office/drawing/2010/main" xmlns="" w="9525">
+                  <a14:hiddenLine xmlns="" xmlns:a14="http://schemas.microsoft.com/office/drawing/2010/main" w="9525">
                     <a:solidFill>
                       <a:srgbClr val="000000"/>
                     </a:solidFill>
@@ -11129,7 +11134,7 @@
               </a:ln>
               <a:extLst>
                 <a:ext uri="{91240B29-F687-4f45-9708-019B960494DF}">
-                  <a14:hiddenLine xmlns:a14="http://schemas.microsoft.com/office/drawing/2010/main" xmlns="" w="9525">
+                  <a14:hiddenLine xmlns="" xmlns:a14="http://schemas.microsoft.com/office/drawing/2010/main" w="9525">
                     <a:solidFill>
                       <a:srgbClr val="000000"/>
                     </a:solidFill>
@@ -11219,7 +11224,7 @@
               </a:ln>
               <a:extLst>
                 <a:ext uri="{91240B29-F687-4f45-9708-019B960494DF}">
-                  <a14:hiddenLine xmlns:a14="http://schemas.microsoft.com/office/drawing/2010/main" xmlns="" w="9525">
+                  <a14:hiddenLine xmlns="" xmlns:a14="http://schemas.microsoft.com/office/drawing/2010/main" w="9525">
                     <a:solidFill>
                       <a:srgbClr val="000000"/>
                     </a:solidFill>
@@ -11309,7 +11314,7 @@
               </a:ln>
               <a:extLst>
                 <a:ext uri="{91240B29-F687-4f45-9708-019B960494DF}">
-                  <a14:hiddenLine xmlns:a14="http://schemas.microsoft.com/office/drawing/2010/main" xmlns="" w="9525">
+                  <a14:hiddenLine xmlns="" xmlns:a14="http://schemas.microsoft.com/office/drawing/2010/main" w="9525">
                     <a:solidFill>
                       <a:srgbClr val="000000"/>
                     </a:solidFill>
@@ -11374,7 +11379,7 @@
               </a:ln>
               <a:extLst>
                 <a:ext uri="{91240B29-F687-4f45-9708-019B960494DF}">
-                  <a14:hiddenLine xmlns:a14="http://schemas.microsoft.com/office/drawing/2010/main" xmlns="" w="9525">
+                  <a14:hiddenLine xmlns="" xmlns:a14="http://schemas.microsoft.com/office/drawing/2010/main" w="9525">
                     <a:solidFill>
                       <a:srgbClr val="000000"/>
                     </a:solidFill>
@@ -11494,7 +11499,7 @@
               </a:ln>
               <a:extLst>
                 <a:ext uri="{91240B29-F687-4f45-9708-019B960494DF}">
-                  <a14:hiddenLine xmlns:a14="http://schemas.microsoft.com/office/drawing/2010/main" xmlns="" w="9525">
+                  <a14:hiddenLine xmlns="" xmlns:a14="http://schemas.microsoft.com/office/drawing/2010/main" w="9525">
                     <a:solidFill>
                       <a:srgbClr val="000000"/>
                     </a:solidFill>
@@ -11592,7 +11597,7 @@
               </a:ln>
               <a:extLst>
                 <a:ext uri="{91240B29-F687-4f45-9708-019B960494DF}">
-                  <a14:hiddenLine xmlns:a14="http://schemas.microsoft.com/office/drawing/2010/main" xmlns="" w="9525">
+                  <a14:hiddenLine xmlns="" xmlns:a14="http://schemas.microsoft.com/office/drawing/2010/main" w="9525">
                     <a:solidFill>
                       <a:srgbClr val="000000"/>
                     </a:solidFill>
@@ -11707,7 +11712,7 @@
               </a:ln>
               <a:extLst>
                 <a:ext uri="{91240B29-F687-4f45-9708-019B960494DF}">
-                  <a14:hiddenLine xmlns:a14="http://schemas.microsoft.com/office/drawing/2010/main" xmlns="" w="9525">
+                  <a14:hiddenLine xmlns="" xmlns:a14="http://schemas.microsoft.com/office/drawing/2010/main" w="9525">
                     <a:solidFill>
                       <a:srgbClr val="000000"/>
                     </a:solidFill>
@@ -11797,7 +11802,7 @@
               </a:ln>
               <a:extLst>
                 <a:ext uri="{91240B29-F687-4f45-9708-019B960494DF}">
-                  <a14:hiddenLine xmlns:a14="http://schemas.microsoft.com/office/drawing/2010/main" xmlns="" w="9525">
+                  <a14:hiddenLine xmlns="" xmlns:a14="http://schemas.microsoft.com/office/drawing/2010/main" w="9525">
                     <a:solidFill>
                       <a:srgbClr val="000000"/>
                     </a:solidFill>
@@ -11862,7 +11867,7 @@
               </a:ln>
               <a:extLst>
                 <a:ext uri="{91240B29-F687-4f45-9708-019B960494DF}">
-                  <a14:hiddenLine xmlns:a14="http://schemas.microsoft.com/office/drawing/2010/main" xmlns="" w="9525">
+                  <a14:hiddenLine xmlns="" xmlns:a14="http://schemas.microsoft.com/office/drawing/2010/main" w="9525">
                     <a:solidFill>
                       <a:srgbClr val="000000"/>
                     </a:solidFill>
@@ -11952,7 +11957,7 @@
               </a:ln>
               <a:extLst>
                 <a:ext uri="{91240B29-F687-4f45-9708-019B960494DF}">
-                  <a14:hiddenLine xmlns:a14="http://schemas.microsoft.com/office/drawing/2010/main" xmlns="" w="9525">
+                  <a14:hiddenLine xmlns="" xmlns:a14="http://schemas.microsoft.com/office/drawing/2010/main" w="9525">
                     <a:solidFill>
                       <a:srgbClr val="000000"/>
                     </a:solidFill>
@@ -12020,7 +12025,7 @@
               </a:ln>
               <a:extLst>
                 <a:ext uri="{91240B29-F687-4f45-9708-019B960494DF}">
-                  <a14:hiddenLine xmlns:a14="http://schemas.microsoft.com/office/drawing/2010/main" xmlns="" w="9525">
+                  <a14:hiddenLine xmlns="" xmlns:a14="http://schemas.microsoft.com/office/drawing/2010/main" w="9525">
                     <a:solidFill>
                       <a:srgbClr val="000000"/>
                     </a:solidFill>
@@ -12110,7 +12115,7 @@
               </a:ln>
               <a:extLst>
                 <a:ext uri="{91240B29-F687-4f45-9708-019B960494DF}">
-                  <a14:hiddenLine xmlns:a14="http://schemas.microsoft.com/office/drawing/2010/main" xmlns="" w="9525">
+                  <a14:hiddenLine xmlns="" xmlns:a14="http://schemas.microsoft.com/office/drawing/2010/main" w="9525">
                     <a:solidFill>
                       <a:srgbClr val="000000"/>
                     </a:solidFill>
@@ -12178,7 +12183,7 @@
               </a:ln>
               <a:extLst>
                 <a:ext uri="{91240B29-F687-4f45-9708-019B960494DF}">
-                  <a14:hiddenLine xmlns:a14="http://schemas.microsoft.com/office/drawing/2010/main" xmlns="" w="9525">
+                  <a14:hiddenLine xmlns="" xmlns:a14="http://schemas.microsoft.com/office/drawing/2010/main" w="9525">
                     <a:solidFill>
                       <a:srgbClr val="000000"/>
                     </a:solidFill>
@@ -12268,7 +12273,7 @@
               </a:ln>
               <a:extLst>
                 <a:ext uri="{91240B29-F687-4f45-9708-019B960494DF}">
-                  <a14:hiddenLine xmlns:a14="http://schemas.microsoft.com/office/drawing/2010/main" xmlns="" w="9525">
+                  <a14:hiddenLine xmlns="" xmlns:a14="http://schemas.microsoft.com/office/drawing/2010/main" w="9525">
                     <a:solidFill>
                       <a:srgbClr val="000000"/>
                     </a:solidFill>
@@ -12302,7 +12307,7 @@
               </a:ln>
               <a:extLst>
                 <a:ext uri="{91240B29-F687-4f45-9708-019B960494DF}">
-                  <a14:hiddenLine xmlns:a14="http://schemas.microsoft.com/office/drawing/2010/main" xmlns="" w="9525">
+                  <a14:hiddenLine xmlns="" xmlns:a14="http://schemas.microsoft.com/office/drawing/2010/main" w="9525">
                     <a:solidFill>
                       <a:srgbClr val="000000"/>
                     </a:solidFill>
@@ -12442,7 +12447,7 @@
           <a:p>
             <a:fld id="{9BB8A965-9F7D-47D3-8EA6-86874B5CADDF}" type="datetimeFigureOut">
               <a:rPr lang="en-US" smtClean="0"/>
-              <a:t>5/9/2025</a:t>
+              <a:t>5/10/2025</a:t>
             </a:fld>
             <a:endParaRPr lang="en-US"/>
           </a:p>
@@ -13640,6 +13645,18 @@
           <a:lstStyle/>
           <a:p>
             <a:r>
+              <a:rPr lang="en-US" sz="9600" b="1" spc="600" dirty="0">
+                <a:solidFill>
+                  <a:schemeClr val="accent2">
+                    <a:lumMod val="20000"/>
+                    <a:lumOff val="80000"/>
+                  </a:schemeClr>
+                </a:solidFill>
+                <a:latin typeface="Bahnschrift Condensed" panose="020B0502040204020203" pitchFamily="34" charset="0"/>
+              </a:rPr>
+              <a:t>HR</a:t>
+            </a:r>
+            <a:r>
               <a:rPr lang="en-US" sz="8800" b="1" spc="600" dirty="0">
                 <a:solidFill>
                   <a:schemeClr val="accent2">
@@ -13649,7 +13666,7 @@
                 </a:solidFill>
                 <a:latin typeface="Bahnschrift Condensed" panose="020B0502040204020203" pitchFamily="34" charset="0"/>
               </a:rPr>
-              <a:t>HR </a:t>
+              <a:t> </a:t>
             </a:r>
             <a:r>
               <a:rPr lang="en-US" sz="9600" b="1" spc="600" dirty="0">
@@ -15319,6 +15336,26 @@
               <a:defRPr/>
             </a:pPr>
             <a:r>
+              <a:rPr kumimoji="0" lang="en-US" sz="9600" b="1" i="0" u="none" strike="noStrike" kern="1200" cap="none" spc="600" normalizeH="0" baseline="0" noProof="0" dirty="0">
+                <a:ln>
+                  <a:noFill/>
+                </a:ln>
+                <a:solidFill>
+                  <a:srgbClr val="FAA93A">
+                    <a:lumMod val="20000"/>
+                    <a:lumOff val="80000"/>
+                  </a:srgbClr>
+                </a:solidFill>
+                <a:effectLst/>
+                <a:uLnTx/>
+                <a:uFillTx/>
+                <a:latin typeface="Bahnschrift Condensed" panose="020B0502040204020203" pitchFamily="34" charset="0"/>
+                <a:ea typeface="+mn-ea"/>
+                <a:cs typeface="+mn-cs"/>
+              </a:rPr>
+              <a:t>HR</a:t>
+            </a:r>
+            <a:r>
               <a:rPr kumimoji="0" lang="en-US" sz="8800" b="1" i="0" u="none" strike="noStrike" kern="1200" cap="none" spc="600" normalizeH="0" baseline="0" noProof="0" dirty="0">
                 <a:ln>
                   <a:noFill/>
@@ -15336,7 +15373,7 @@
                 <a:ea typeface="+mn-ea"/>
                 <a:cs typeface="+mn-cs"/>
               </a:rPr>
-              <a:t>HR </a:t>
+              <a:t> </a:t>
             </a:r>
             <a:r>
               <a:rPr kumimoji="0" lang="en-US" sz="9600" b="1" i="0" u="none" strike="noStrike" kern="1200" cap="none" spc="600" normalizeH="0" baseline="0" noProof="0" dirty="0">
@@ -17304,6 +17341,26 @@
               <a:defRPr/>
             </a:pPr>
             <a:r>
+              <a:rPr kumimoji="0" lang="en-US" sz="9600" b="1" i="0" u="none" strike="noStrike" kern="1200" cap="none" spc="600" normalizeH="0" baseline="0" noProof="0" dirty="0">
+                <a:ln>
+                  <a:noFill/>
+                </a:ln>
+                <a:solidFill>
+                  <a:srgbClr val="FAA93A">
+                    <a:lumMod val="20000"/>
+                    <a:lumOff val="80000"/>
+                  </a:srgbClr>
+                </a:solidFill>
+                <a:effectLst/>
+                <a:uLnTx/>
+                <a:uFillTx/>
+                <a:latin typeface="Bahnschrift Condensed" panose="020B0502040204020203" pitchFamily="34" charset="0"/>
+                <a:ea typeface="+mn-ea"/>
+                <a:cs typeface="+mn-cs"/>
+              </a:rPr>
+              <a:t>HR</a:t>
+            </a:r>
+            <a:r>
               <a:rPr kumimoji="0" lang="en-US" sz="8800" b="1" i="0" u="none" strike="noStrike" kern="1200" cap="none" spc="600" normalizeH="0" baseline="0" noProof="0" dirty="0">
                 <a:ln>
                   <a:noFill/>
@@ -17321,7 +17378,7 @@
                 <a:ea typeface="+mn-ea"/>
                 <a:cs typeface="+mn-cs"/>
               </a:rPr>
-              <a:t>HR </a:t>
+              <a:t> </a:t>
             </a:r>
             <a:r>
               <a:rPr kumimoji="0" lang="en-US" sz="9600" b="1" i="0" u="none" strike="noStrike" kern="1200" cap="none" spc="600" normalizeH="0" baseline="0" noProof="0" dirty="0">

</xml_diff>